<commit_message>
Convert some images to code
</commit_message>
<xml_diff>
--- a/diagrams/errorHandling/defensiveProgramming/compulsoryAssociations/accountGuarantor.pptx
+++ b/diagrams/errorHandling/defensiveProgramming/compulsoryAssociations/accountGuarantor.pptx
@@ -3103,7 +3103,7 @@
         </p:nvSpPr>
         <p:spPr>
           <a:xfrm>
-            <a:off x="235217" y="2128364"/>
+            <a:off x="2887473" y="2611171"/>
             <a:ext cx="1266321" cy="647700"/>
           </a:xfrm>
           <a:prstGeom prst="rect">
@@ -3158,7 +3158,7 @@
         </p:nvSpPr>
         <p:spPr>
           <a:xfrm>
-            <a:off x="2444760" y="2166464"/>
+            <a:off x="5097016" y="2649271"/>
             <a:ext cx="1250337" cy="609600"/>
           </a:xfrm>
           <a:prstGeom prst="rect">
@@ -3215,7 +3215,7 @@
         </p:nvCxnSpPr>
         <p:spPr>
           <a:xfrm>
-            <a:off x="1501539" y="2470470"/>
+            <a:off x="4153795" y="2953277"/>
             <a:ext cx="943221" cy="794"/>
           </a:xfrm>
           <a:prstGeom prst="bentConnector3">
@@ -3254,7 +3254,7 @@
         </p:nvSpPr>
         <p:spPr>
           <a:xfrm>
-            <a:off x="2063760" y="2014064"/>
+            <a:off x="4716016" y="2496871"/>
             <a:ext cx="314510" cy="400110"/>
           </a:xfrm>
           <a:prstGeom prst="rect">
@@ -3279,250 +3279,6 @@
               <a:solidFill>
                 <a:srgbClr val="FF0000"/>
               </a:solidFill>
-            </a:endParaRPr>
-          </a:p>
-        </p:txBody>
-      </p:sp>
-      <p:sp>
-        <p:nvSpPr>
-          <p:cNvPr id="8" name="Content Placeholder 3"/>
-          <p:cNvSpPr txBox="1">
-            <a:spLocks/>
-          </p:cNvSpPr>
-          <p:nvPr/>
-        </p:nvSpPr>
-        <p:spPr>
-          <a:xfrm>
-            <a:off x="4139952" y="1700808"/>
-            <a:ext cx="4491219" cy="2185214"/>
-          </a:xfrm>
-          <a:prstGeom prst="rect">
-            <a:avLst/>
-          </a:prstGeom>
-          <a:solidFill>
-            <a:schemeClr val="bg1"/>
-          </a:solidFill>
-          <a:ln>
-            <a:solidFill>
-              <a:schemeClr val="accent1"/>
-            </a:solidFill>
-            <a:prstDash val="dash"/>
-          </a:ln>
-        </p:spPr>
-        <p:txBody>
-          <a:bodyPr vert="horz" wrap="square" lIns="91440" tIns="45720" rIns="91440" bIns="45720" rtlCol="0">
-            <a:spAutoFit/>
-          </a:bodyPr>
-          <a:lstStyle/>
-          <a:p>
-            <a:pPr marL="342900" marR="0" lvl="0" indent="-342900" algn="l" defTabSz="914400" rtl="0" eaLnBrk="1" fontAlgn="auto" latinLnBrk="0" hangingPunct="1">
-              <a:lnSpc>
-                <a:spcPct val="100000"/>
-              </a:lnSpc>
-              <a:spcBef>
-                <a:spcPct val="20000"/>
-              </a:spcBef>
-              <a:spcAft>
-                <a:spcPts val="0"/>
-              </a:spcAft>
-              <a:buClrTx/>
-              <a:buSzPct val="50000"/>
-              <a:buFont typeface="Wingdings" pitchFamily="2" charset="2"/>
-              <a:buNone/>
-              <a:tabLst/>
-              <a:defRPr/>
-            </a:pPr>
-            <a:r>
-              <a:rPr kumimoji="0" lang="en-US" sz="2000" b="0" i="0" u="none" strike="noStrike" kern="1200" cap="none" spc="0" normalizeH="0" baseline="0" noProof="0" dirty="0" smtClean="0">
-                <a:ln>
-                  <a:noFill/>
-                </a:ln>
-                <a:solidFill>
-                  <a:schemeClr val="tx1"/>
-                </a:solidFill>
-                <a:effectLst/>
-                <a:uLnTx/>
-                <a:uFillTx/>
-                <a:ea typeface="+mn-ea"/>
-                <a:cs typeface="+mn-cs"/>
-              </a:rPr>
-              <a:t>class Account {</a:t>
-            </a:r>
-          </a:p>
-          <a:p>
-            <a:pPr marL="779266" lvl="1" indent="-342900" defTabSz="914400">
-              <a:spcBef>
-                <a:spcPct val="20000"/>
-              </a:spcBef>
-              <a:buSzPct val="50000"/>
-              <a:buFont typeface="Wingdings" pitchFamily="2" charset="2"/>
-              <a:buNone/>
-              <a:defRPr/>
-            </a:pPr>
-            <a:r>
-              <a:rPr kumimoji="0" lang="en-US" sz="2000" b="0" i="0" u="none" strike="noStrike" kern="1200" cap="none" spc="0" normalizeH="0" baseline="0" noProof="0" dirty="0" smtClean="0">
-                <a:ln>
-                  <a:noFill/>
-                </a:ln>
-                <a:solidFill>
-                  <a:schemeClr val="tx1"/>
-                </a:solidFill>
-                <a:effectLst/>
-                <a:uLnTx/>
-                <a:uFillTx/>
-                <a:ea typeface="+mn-ea"/>
-                <a:cs typeface="+mn-cs"/>
-              </a:rPr>
-              <a:t>Guarantor </a:t>
-            </a:r>
-            <a:r>
-              <a:rPr kumimoji="0" lang="en-US" sz="2000" b="0" i="0" u="none" strike="noStrike" kern="1200" cap="none" spc="0" normalizeH="0" baseline="0" noProof="0" dirty="0" err="1" smtClean="0">
-                <a:ln>
-                  <a:noFill/>
-                </a:ln>
-                <a:solidFill>
-                  <a:schemeClr val="tx1"/>
-                </a:solidFill>
-                <a:effectLst/>
-                <a:uLnTx/>
-                <a:uFillTx/>
-                <a:ea typeface="+mn-ea"/>
-                <a:cs typeface="+mn-cs"/>
-              </a:rPr>
-              <a:t>guarantor</a:t>
-            </a:r>
-            <a:r>
-              <a:rPr lang="en-US" sz="2000" dirty="0" smtClean="0"/>
-              <a:t>;</a:t>
-            </a:r>
-          </a:p>
-          <a:p>
-            <a:pPr marL="779266" lvl="1" indent="-342900" defTabSz="914400">
-              <a:spcBef>
-                <a:spcPct val="20000"/>
-              </a:spcBef>
-              <a:buSzPct val="50000"/>
-              <a:buFont typeface="Wingdings" pitchFamily="2" charset="2"/>
-              <a:buNone/>
-              <a:defRPr/>
-            </a:pPr>
-            <a:r>
-              <a:rPr lang="en-US" sz="2000" dirty="0" smtClean="0"/>
-              <a:t>void </a:t>
-            </a:r>
-            <a:r>
-              <a:rPr lang="en-US" sz="2000" dirty="0" err="1" smtClean="0"/>
-              <a:t>setGuarantor</a:t>
-            </a:r>
-            <a:r>
-              <a:rPr lang="en-US" sz="2000" dirty="0" smtClean="0"/>
-              <a:t>(Guarantor </a:t>
-            </a:r>
-            <a:r>
-              <a:rPr kumimoji="0" lang="en-US" sz="2000" b="0" i="0" u="none" strike="noStrike" kern="1200" cap="none" spc="0" normalizeH="0" baseline="0" noProof="0" dirty="0" smtClean="0">
-                <a:ln>
-                  <a:noFill/>
-                </a:ln>
-                <a:solidFill>
-                  <a:schemeClr val="tx1"/>
-                </a:solidFill>
-                <a:effectLst/>
-                <a:uLnTx/>
-                <a:uFillTx/>
-                <a:ea typeface="+mn-ea"/>
-                <a:cs typeface="+mn-cs"/>
-              </a:rPr>
-              <a:t>g){</a:t>
-            </a:r>
-            <a:r>
-              <a:rPr lang="en-US" sz="2000" dirty="0" smtClean="0"/>
-              <a:t/>
-            </a:r>
-            <a:br>
-              <a:rPr lang="en-US" sz="2000" dirty="0" smtClean="0"/>
-            </a:br>
-            <a:r>
-              <a:rPr lang="en-US" sz="2000" dirty="0" smtClean="0"/>
-              <a:t> guarantor = </a:t>
-            </a:r>
-            <a:r>
-              <a:rPr kumimoji="0" lang="en-US" sz="2000" b="0" i="0" u="none" strike="noStrike" kern="1200" cap="none" spc="0" normalizeH="0" baseline="0" noProof="0" dirty="0" smtClean="0">
-                <a:ln>
-                  <a:noFill/>
-                </a:ln>
-                <a:solidFill>
-                  <a:schemeClr val="tx1"/>
-                </a:solidFill>
-                <a:effectLst/>
-                <a:uLnTx/>
-                <a:uFillTx/>
-                <a:ea typeface="+mn-ea"/>
-                <a:cs typeface="+mn-cs"/>
-              </a:rPr>
-              <a:t>g;</a:t>
-            </a:r>
-          </a:p>
-          <a:p>
-            <a:pPr marL="779266" lvl="1" indent="-342900" defTabSz="914400">
-              <a:spcBef>
-                <a:spcPct val="20000"/>
-              </a:spcBef>
-              <a:buSzPct val="50000"/>
-              <a:buFont typeface="Wingdings" pitchFamily="2" charset="2"/>
-              <a:buNone/>
-              <a:defRPr/>
-            </a:pPr>
-            <a:r>
-              <a:rPr kumimoji="0" lang="en-US" sz="2000" b="0" i="0" u="none" strike="noStrike" kern="1200" cap="none" spc="0" normalizeH="0" baseline="0" noProof="0" dirty="0" smtClean="0">
-                <a:ln>
-                  <a:noFill/>
-                </a:ln>
-                <a:solidFill>
-                  <a:schemeClr val="tx1"/>
-                </a:solidFill>
-                <a:effectLst/>
-                <a:uLnTx/>
-                <a:uFillTx/>
-                <a:ea typeface="+mn-ea"/>
-                <a:cs typeface="+mn-cs"/>
-              </a:rPr>
-              <a:t>}</a:t>
-            </a:r>
-          </a:p>
-          <a:p>
-            <a:pPr marL="342900" marR="0" lvl="0" indent="-342900" algn="l" defTabSz="914400" rtl="0" eaLnBrk="1" fontAlgn="auto" latinLnBrk="0" hangingPunct="1">
-              <a:lnSpc>
-                <a:spcPct val="100000"/>
-              </a:lnSpc>
-              <a:spcBef>
-                <a:spcPct val="20000"/>
-              </a:spcBef>
-              <a:spcAft>
-                <a:spcPts val="0"/>
-              </a:spcAft>
-              <a:buClrTx/>
-              <a:buSzPct val="50000"/>
-              <a:buFont typeface="Wingdings" pitchFamily="2" charset="2"/>
-              <a:buNone/>
-              <a:tabLst/>
-              <a:defRPr/>
-            </a:pPr>
-            <a:r>
-              <a:rPr lang="en-US" sz="2000" dirty="0" smtClean="0"/>
-              <a:t>}</a:t>
-            </a:r>
-            <a:endParaRPr kumimoji="0" lang="en-US" sz="2000" b="0" i="0" u="none" strike="noStrike" kern="1200" cap="none" spc="0" normalizeH="0" baseline="0" noProof="0" dirty="0">
-              <a:ln>
-                <a:noFill/>
-              </a:ln>
-              <a:solidFill>
-                <a:schemeClr val="tx1"/>
-              </a:solidFill>
-              <a:effectLst/>
-              <a:uLnTx/>
-              <a:uFillTx/>
-              <a:ea typeface="+mn-ea"/>
-              <a:cs typeface="+mn-cs"/>
             </a:endParaRPr>
           </a:p>
         </p:txBody>

</xml_diff>